<commit_message>
Update slides for real
</commit_message>
<xml_diff>
--- a/JT - data in and out of R.Plug In 2019.pptx
+++ b/JT - data in and out of R.Plug In 2019.pptx
@@ -5,7 +5,7 @@
     <p:sldMasterId id="2147483648" r:id="rId1"/>
   </p:sldMasterIdLst>
   <p:notesMasterIdLst>
-    <p:notesMasterId r:id="rId18"/>
+    <p:notesMasterId r:id="rId17"/>
   </p:notesMasterIdLst>
   <p:sldIdLst>
     <p:sldId id="257" r:id="rId2"/>
@@ -23,7 +23,6 @@
     <p:sldId id="284" r:id="rId14"/>
     <p:sldId id="287" r:id="rId15"/>
     <p:sldId id="285" r:id="rId16"/>
-    <p:sldId id="272" r:id="rId17"/>
   </p:sldIdLst>
   <p:sldSz cx="9144000" cy="6858000" type="screen4x3"/>
   <p:notesSz cx="6858000" cy="9144000"/>
@@ -2258,7 +2257,121 @@
           </a:bodyPr>
           <a:lstStyle/>
           <a:p>
+            <a:r>
+              <a:rPr lang="en-US" dirty="0"/>
+              <a:t>I put all of the things up on </a:t>
+            </a:r>
+            <a:r>
+              <a:rPr lang="en-US" dirty="0" err="1"/>
+              <a:t>Github</a:t>
+            </a:r>
+            <a:r>
+              <a:rPr lang="en-US" dirty="0"/>
+              <a:t>. Go and clone that repo to play around.</a:t>
+            </a:r>
+          </a:p>
+          <a:p>
+            <a:pPr marL="457200" lvl="1" indent="0">
+              <a:buNone/>
+            </a:pPr>
+            <a:r>
+              <a:rPr lang="en-US" sz="2400" dirty="0">
+                <a:hlinkClick r:id="rId2"/>
+              </a:rPr>
+              <a:t>https://github.com/crazybilly/getting-data-in-out-of-R</a:t>
+            </a:r>
+            <a:endParaRPr lang="en-US" sz="2400" dirty="0"/>
+          </a:p>
+          <a:p>
+            <a:pPr marL="457200" lvl="1" indent="0">
+              <a:buNone/>
+            </a:pPr>
+            <a:endParaRPr lang="en-US" sz="2400" dirty="0"/>
+          </a:p>
+          <a:p>
+            <a:r>
+              <a:rPr lang="en-US" dirty="0"/>
+              <a:t>Other useful functions in </a:t>
+            </a:r>
+            <a:r>
+              <a:rPr lang="en-US" dirty="0" err="1">
+                <a:hlinkClick r:id="rId3"/>
+              </a:rPr>
+              <a:t>muadc</a:t>
+            </a:r>
+            <a:r>
+              <a:rPr lang="en-US" dirty="0">
+                <a:hlinkClick r:id="rId3"/>
+              </a:rPr>
+              <a:t> package</a:t>
+            </a:r>
             <a:endParaRPr lang="en-US" dirty="0"/>
+          </a:p>
+          <a:p>
+            <a:pPr lvl="1"/>
+            <a:r>
+              <a:rPr lang="en-US" dirty="0" err="1">
+                <a:latin typeface="Courier New" panose="02070309020205020404" pitchFamily="49" charset="0"/>
+                <a:cs typeface="Courier New" panose="02070309020205020404" pitchFamily="49" charset="0"/>
+              </a:rPr>
+              <a:t>read.tidy</a:t>
+            </a:r>
+            <a:r>
+              <a:rPr lang="en-US" dirty="0">
+                <a:latin typeface="Courier New" panose="02070309020205020404" pitchFamily="49" charset="0"/>
+                <a:cs typeface="Courier New" panose="02070309020205020404" pitchFamily="49" charset="0"/>
+              </a:rPr>
+              <a:t>()</a:t>
+            </a:r>
+          </a:p>
+          <a:p>
+            <a:pPr lvl="1"/>
+            <a:r>
+              <a:rPr lang="en-US" dirty="0" err="1">
+                <a:latin typeface="Courier New" panose="02070309020205020404" pitchFamily="49" charset="0"/>
+                <a:cs typeface="Courier New" panose="02070309020205020404" pitchFamily="49" charset="0"/>
+              </a:rPr>
+              <a:t>write.tidy</a:t>
+            </a:r>
+            <a:r>
+              <a:rPr lang="en-US" dirty="0">
+                <a:latin typeface="Courier New" panose="02070309020205020404" pitchFamily="49" charset="0"/>
+                <a:cs typeface="Courier New" panose="02070309020205020404" pitchFamily="49" charset="0"/>
+              </a:rPr>
+              <a:t>()</a:t>
+            </a:r>
+          </a:p>
+          <a:p>
+            <a:pPr lvl="1"/>
+            <a:r>
+              <a:rPr lang="en-US" dirty="0" err="1">
+                <a:latin typeface="Courier New" panose="02070309020205020404" pitchFamily="49" charset="0"/>
+                <a:cs typeface="Courier New" panose="02070309020205020404" pitchFamily="49" charset="0"/>
+              </a:rPr>
+              <a:t>write.clip</a:t>
+            </a:r>
+            <a:r>
+              <a:rPr lang="en-US" dirty="0">
+                <a:latin typeface="Courier New" panose="02070309020205020404" pitchFamily="49" charset="0"/>
+                <a:cs typeface="Courier New" panose="02070309020205020404" pitchFamily="49" charset="0"/>
+              </a:rPr>
+              <a:t>()</a:t>
+            </a:r>
+            <a:r>
+              <a:rPr lang="en-US" dirty="0"/>
+              <a:t> and its fancy </a:t>
+            </a:r>
+            <a:r>
+              <a:rPr lang="en-US" dirty="0">
+                <a:latin typeface="Courier New" panose="02070309020205020404" pitchFamily="49" charset="0"/>
+                <a:cs typeface="Courier New" panose="02070309020205020404" pitchFamily="49" charset="0"/>
+              </a:rPr>
+              <a:t>excel = T </a:t>
+            </a:r>
+            <a:r>
+              <a:rPr lang="en-US" dirty="0"/>
+              <a:t>argument!</a:t>
+            </a:r>
           </a:p>
         </p:txBody>
       </p:sp>
@@ -2339,74 +2452,6 @@
     <p:extLst>
       <p:ext uri="{BB962C8B-B14F-4D97-AF65-F5344CB8AC3E}">
         <p14:creationId xmlns:p14="http://schemas.microsoft.com/office/powerpoint/2010/main" val="3610215792"/>
-      </p:ext>
-    </p:extLst>
-  </p:cSld>
-  <p:clrMapOvr>
-    <a:masterClrMapping/>
-  </p:clrMapOvr>
-</p:sld>
-</file>
-
-<file path=ppt/slides/slide16.xml><?xml version="1.0" encoding="utf-8"?>
-<p:sld xmlns:a="http://schemas.openxmlformats.org/drawingml/2006/main" xmlns:r="http://schemas.openxmlformats.org/officeDocument/2006/relationships" xmlns:p="http://schemas.openxmlformats.org/presentationml/2006/main">
-  <p:cSld>
-    <p:spTree>
-      <p:nvGrpSpPr>
-        <p:cNvPr id="1" name=""/>
-        <p:cNvGrpSpPr/>
-        <p:nvPr/>
-      </p:nvGrpSpPr>
-      <p:grpSpPr>
-        <a:xfrm>
-          <a:off x="0" y="0"/>
-          <a:ext cx="0" cy="0"/>
-          <a:chOff x="0" y="0"/>
-          <a:chExt cx="0" cy="0"/>
-        </a:xfrm>
-      </p:grpSpPr>
-      <p:sp>
-        <p:nvSpPr>
-          <p:cNvPr id="2" name="Title 1"/>
-          <p:cNvSpPr>
-            <a:spLocks noGrp="1"/>
-          </p:cNvSpPr>
-          <p:nvPr>
-            <p:ph type="title"/>
-          </p:nvPr>
-        </p:nvSpPr>
-        <p:spPr/>
-        <p:txBody>
-          <a:bodyPr/>
-          <a:lstStyle/>
-          <a:p>
-            <a:endParaRPr lang="en-US" dirty="0"/>
-          </a:p>
-        </p:txBody>
-      </p:sp>
-      <p:sp>
-        <p:nvSpPr>
-          <p:cNvPr id="3" name="Content Placeholder 2"/>
-          <p:cNvSpPr>
-            <a:spLocks noGrp="1"/>
-          </p:cNvSpPr>
-          <p:nvPr>
-            <p:ph idx="1"/>
-          </p:nvPr>
-        </p:nvSpPr>
-        <p:spPr/>
-        <p:txBody>
-          <a:bodyPr/>
-          <a:lstStyle/>
-          <a:p>
-            <a:endParaRPr lang="en-US"/>
-          </a:p>
-        </p:txBody>
-      </p:sp>
-    </p:spTree>
-    <p:extLst>
-      <p:ext uri="{BB962C8B-B14F-4D97-AF65-F5344CB8AC3E}">
-        <p14:creationId xmlns:p14="http://schemas.microsoft.com/office/powerpoint/2010/main" val="238808411"/>
       </p:ext>
     </p:extLst>
   </p:cSld>

</xml_diff>